<commit_message>
E5T2 & DevSecOpsPipeline newly updated
E5T2 & DevSecOpsPipeline files newly updated after Review
</commit_message>
<xml_diff>
--- a/Project_03/Exercise_5/DevSecOpsPipeline.pptx
+++ b/Project_03/Exercise_5/DevSecOpsPipeline.pptx
@@ -6849,6 +6849,122 @@
           </a:fontRef>
         </p:style>
       </p:cxnSp>
+      <p:sp>
+        <p:nvSpPr>
+          <p:cNvPr id="2" name="Textfeld 1">
+            <a:extLst>
+              <a:ext uri="{FF2B5EF4-FFF2-40B4-BE49-F238E27FC236}">
+                <a16:creationId xmlns:a16="http://schemas.microsoft.com/office/drawing/2014/main" id="{D163B4C8-4617-491F-B26E-3A2BD08054E9}"/>
+              </a:ext>
+            </a:extLst>
+          </p:cNvPr>
+          <p:cNvSpPr txBox="1"/>
+          <p:nvPr/>
+        </p:nvSpPr>
+        <p:spPr>
+          <a:xfrm>
+            <a:off x="3365973" y="4164168"/>
+            <a:ext cx="1125345" cy="307777"/>
+          </a:xfrm>
+          <a:prstGeom prst="rect">
+            <a:avLst/>
+          </a:prstGeom>
+          <a:solidFill>
+            <a:srgbClr val="92D050"/>
+          </a:solidFill>
+        </p:spPr>
+        <p:txBody>
+          <a:bodyPr wrap="square" rtlCol="0">
+            <a:spAutoFit/>
+          </a:bodyPr>
+          <a:lstStyle/>
+          <a:p>
+            <a:r>
+              <a:rPr lang="de-DE" dirty="0"/>
+              <a:t>Terrascan</a:t>
+            </a:r>
+          </a:p>
+        </p:txBody>
+      </p:sp>
+      <p:sp>
+        <p:nvSpPr>
+          <p:cNvPr id="29" name="Textfeld 28">
+            <a:extLst>
+              <a:ext uri="{FF2B5EF4-FFF2-40B4-BE49-F238E27FC236}">
+                <a16:creationId xmlns:a16="http://schemas.microsoft.com/office/drawing/2014/main" id="{B277924E-20FA-46FE-A92E-C9C1DFEE32DF}"/>
+              </a:ext>
+            </a:extLst>
+          </p:cNvPr>
+          <p:cNvSpPr txBox="1"/>
+          <p:nvPr/>
+        </p:nvSpPr>
+        <p:spPr>
+          <a:xfrm>
+            <a:off x="3393009" y="1380683"/>
+            <a:ext cx="1488988" cy="307777"/>
+          </a:xfrm>
+          <a:prstGeom prst="rect">
+            <a:avLst/>
+          </a:prstGeom>
+          <a:solidFill>
+            <a:srgbClr val="92D050"/>
+          </a:solidFill>
+        </p:spPr>
+        <p:txBody>
+          <a:bodyPr wrap="square" rtlCol="0">
+            <a:spAutoFit/>
+          </a:bodyPr>
+          <a:lstStyle/>
+          <a:p>
+            <a:r>
+              <a:rPr lang="de-DE" dirty="0"/>
+              <a:t>Clair / </a:t>
+            </a:r>
+            <a:r>
+              <a:rPr lang="de-DE" dirty="0" err="1"/>
+              <a:t>Anchore</a:t>
+            </a:r>
+            <a:endParaRPr lang="de-DE" dirty="0"/>
+          </a:p>
+        </p:txBody>
+      </p:sp>
+      <p:sp>
+        <p:nvSpPr>
+          <p:cNvPr id="30" name="Textfeld 29">
+            <a:extLst>
+              <a:ext uri="{FF2B5EF4-FFF2-40B4-BE49-F238E27FC236}">
+                <a16:creationId xmlns:a16="http://schemas.microsoft.com/office/drawing/2014/main" id="{0D19FB3A-FCDF-4293-9648-CF6376A15527}"/>
+              </a:ext>
+            </a:extLst>
+          </p:cNvPr>
+          <p:cNvSpPr txBox="1"/>
+          <p:nvPr/>
+        </p:nvSpPr>
+        <p:spPr>
+          <a:xfrm>
+            <a:off x="6805163" y="1365083"/>
+            <a:ext cx="1666500" cy="307777"/>
+          </a:xfrm>
+          <a:prstGeom prst="rect">
+            <a:avLst/>
+          </a:prstGeom>
+          <a:solidFill>
+            <a:srgbClr val="92D050"/>
+          </a:solidFill>
+        </p:spPr>
+        <p:txBody>
+          <a:bodyPr wrap="square" rtlCol="0">
+            <a:spAutoFit/>
+          </a:bodyPr>
+          <a:lstStyle/>
+          <a:p>
+            <a:r>
+              <a:rPr lang="de-DE" dirty="0"/>
+              <a:t>AWS Security Hub</a:t>
+            </a:r>
+          </a:p>
+        </p:txBody>
+      </p:sp>
     </p:spTree>
   </p:cSld>
   <p:clrMapOvr>

</xml_diff>